<commit_message>
Added our motivation for the project and started slide for why we switched to C#.
</commit_message>
<xml_diff>
--- a/OOAD/Casino Management System.pptx
+++ b/OOAD/Casino Management System.pptx
@@ -11,6 +11,8 @@
     <p:sldId id="259" r:id="rId5"/>
     <p:sldId id="260" r:id="rId6"/>
     <p:sldId id="261" r:id="rId7"/>
+    <p:sldId id="262" r:id="rId8"/>
+    <p:sldId id="263" r:id="rId9"/>
   </p:sldIdLst>
   <p:sldSz cx="12192000" cy="6858000"/>
   <p:notesSz cx="6858000" cy="9144000"/>
@@ -109,7 +111,16 @@
       </a:defRPr>
     </a:lvl9pPr>
   </p:defaultTextStyle>
+  <p:extLst>
+    <p:ext uri="{EFAFB233-063F-42B5-8137-9DF3F51BA10A}">
+      <p15:sldGuideLst xmlns:p15="http://schemas.microsoft.com/office/powerpoint/2012/main"/>
+    </p:ext>
+  </p:extLst>
 </p:presentation>
+</file>
+
+<file path=ppt/revisionInfo.xml><?xml version="1.0" encoding="utf-8"?>
+<p1510:revInfo xmlns:a="http://schemas.openxmlformats.org/drawingml/2006/main" xmlns:r="http://schemas.openxmlformats.org/officeDocument/2006/relationships" xmlns:p1510="http://schemas.microsoft.com/office/powerpoint/2015/10/main"/>
 </file>
 
 <file path=ppt/slideLayouts/slideLayout1.xml><?xml version="1.0" encoding="utf-8"?>
@@ -186,7 +197,7 @@
           </a:lstStyle>
           <a:p>
             <a:r>
-              <a:rPr lang="en-US" smtClean="0"/>
+              <a:rPr lang="en-US"/>
               <a:t>Click to edit Master title style</a:t>
             </a:r>
             <a:endParaRPr lang="en-US" dirty="0"/>
@@ -253,7 +264,7 @@
           </a:lstStyle>
           <a:p>
             <a:r>
-              <a:rPr lang="en-US" smtClean="0"/>
+              <a:rPr lang="en-US"/>
               <a:t>Click to edit Master subtitle style</a:t>
             </a:r>
             <a:endParaRPr lang="en-US" dirty="0"/>
@@ -282,7 +293,7 @@
           <a:p>
             <a:fld id="{5F30C13D-89CF-496E-B466-C5FA982D6985}" type="datetimeFigureOut">
               <a:rPr lang="en-US" smtClean="0"/>
-              <a:t>12/7/2017</a:t>
+              <a:t>12/10/2017</a:t>
             </a:fld>
             <a:endParaRPr lang="en-US"/>
           </a:p>
@@ -395,7 +406,7 @@
           </a:lstStyle>
           <a:p>
             <a:r>
-              <a:rPr lang="en-US" smtClean="0"/>
+              <a:rPr lang="en-US"/>
               <a:t>Click to edit Master title style</a:t>
             </a:r>
             <a:endParaRPr lang="en-US" dirty="0"/>
@@ -460,7 +471,7 @@
           </a:lstStyle>
           <a:p>
             <a:r>
-              <a:rPr lang="en-US" smtClean="0"/>
+              <a:rPr lang="en-US"/>
               <a:t>Click icon to add picture</a:t>
             </a:r>
             <a:endParaRPr lang="en-US" dirty="0"/>
@@ -526,7 +537,7 @@
           <a:p>
             <a:pPr lvl="0"/>
             <a:r>
-              <a:rPr lang="en-US" smtClean="0"/>
+              <a:rPr lang="en-US"/>
               <a:t>Edit Master text styles</a:t>
             </a:r>
           </a:p>
@@ -549,7 +560,7 @@
           <a:p>
             <a:fld id="{5F30C13D-89CF-496E-B466-C5FA982D6985}" type="datetimeFigureOut">
               <a:rPr lang="en-US" smtClean="0"/>
-              <a:t>12/7/2017</a:t>
+              <a:t>12/10/2017</a:t>
             </a:fld>
             <a:endParaRPr lang="en-US"/>
           </a:p>
@@ -682,7 +693,7 @@
           </a:lstStyle>
           <a:p>
             <a:r>
-              <a:rPr lang="en-US" smtClean="0"/>
+              <a:rPr lang="en-US"/>
               <a:t>Click to edit Master title style</a:t>
             </a:r>
             <a:endParaRPr lang="en-US" dirty="0"/>
@@ -748,7 +759,7 @@
           <a:p>
             <a:pPr lvl="0"/>
             <a:r>
-              <a:rPr lang="en-US" smtClean="0"/>
+              <a:rPr lang="en-US"/>
               <a:t>Edit Master text styles</a:t>
             </a:r>
           </a:p>
@@ -780,7 +791,7 @@
           <a:p>
             <a:fld id="{5F30C13D-89CF-496E-B466-C5FA982D6985}" type="datetimeFigureOut">
               <a:rPr lang="en-US" smtClean="0"/>
-              <a:t>12/7/2017</a:t>
+              <a:t>12/10/2017</a:t>
             </a:fld>
             <a:endParaRPr lang="en-US"/>
           </a:p>
@@ -923,7 +934,7 @@
           </a:lstStyle>
           <a:p>
             <a:r>
-              <a:rPr lang="en-US" smtClean="0"/>
+              <a:rPr lang="en-US"/>
               <a:t>Click to edit Master title style</a:t>
             </a:r>
             <a:endParaRPr lang="en-US" dirty="0"/>
@@ -991,7 +1002,7 @@
           <a:p>
             <a:pPr lvl="0"/>
             <a:r>
-              <a:rPr lang="en-US" smtClean="0"/>
+              <a:rPr lang="en-US"/>
               <a:t>Edit Master text styles</a:t>
             </a:r>
           </a:p>
@@ -1058,7 +1069,7 @@
           <a:p>
             <a:pPr lvl="0"/>
             <a:r>
-              <a:rPr lang="en-US" smtClean="0"/>
+              <a:rPr lang="en-US"/>
               <a:t>Edit Master text styles</a:t>
             </a:r>
           </a:p>
@@ -1090,7 +1101,7 @@
           <a:p>
             <a:fld id="{5F30C13D-89CF-496E-B466-C5FA982D6985}" type="datetimeFigureOut">
               <a:rPr lang="en-US" smtClean="0"/>
-              <a:t>12/7/2017</a:t>
+              <a:t>12/10/2017</a:t>
             </a:fld>
             <a:endParaRPr lang="en-US"/>
           </a:p>
@@ -1465,7 +1476,7 @@
           </a:lstStyle>
           <a:p>
             <a:r>
-              <a:rPr lang="en-US" smtClean="0"/>
+              <a:rPr lang="en-US"/>
               <a:t>Click to edit Master title style</a:t>
             </a:r>
             <a:endParaRPr lang="en-US" dirty="0"/>
@@ -1531,7 +1542,7 @@
           <a:p>
             <a:pPr lvl="0"/>
             <a:r>
-              <a:rPr lang="en-US" smtClean="0"/>
+              <a:rPr lang="en-US"/>
               <a:t>Edit Master text styles</a:t>
             </a:r>
           </a:p>
@@ -1563,7 +1574,7 @@
           <a:p>
             <a:fld id="{5F30C13D-89CF-496E-B466-C5FA982D6985}" type="datetimeFigureOut">
               <a:rPr lang="en-US" smtClean="0"/>
-              <a:t>12/7/2017</a:t>
+              <a:t>12/10/2017</a:t>
             </a:fld>
             <a:endParaRPr lang="en-US"/>
           </a:p>
@@ -1672,7 +1683,7 @@
           <a:lstStyle/>
           <a:p>
             <a:r>
-              <a:rPr lang="en-US" smtClean="0"/>
+              <a:rPr lang="en-US"/>
               <a:t>Click to edit Master title style</a:t>
             </a:r>
             <a:endParaRPr lang="en-US" dirty="0"/>
@@ -1744,7 +1755,7 @@
           <a:p>
             <a:pPr lvl="0"/>
             <a:r>
-              <a:rPr lang="en-US" smtClean="0"/>
+              <a:rPr lang="en-US"/>
               <a:t>Edit Master text styles</a:t>
             </a:r>
           </a:p>
@@ -1811,7 +1822,7 @@
           <a:p>
             <a:pPr lvl="0"/>
             <a:r>
-              <a:rPr lang="en-US" smtClean="0"/>
+              <a:rPr lang="en-US"/>
               <a:t>Edit Master text styles</a:t>
             </a:r>
           </a:p>
@@ -1882,7 +1893,7 @@
           <a:p>
             <a:pPr lvl="0"/>
             <a:r>
-              <a:rPr lang="en-US" smtClean="0"/>
+              <a:rPr lang="en-US"/>
               <a:t>Edit Master text styles</a:t>
             </a:r>
           </a:p>
@@ -1949,7 +1960,7 @@
           <a:p>
             <a:pPr lvl="0"/>
             <a:r>
-              <a:rPr lang="en-US" smtClean="0"/>
+              <a:rPr lang="en-US"/>
               <a:t>Edit Master text styles</a:t>
             </a:r>
           </a:p>
@@ -2020,7 +2031,7 @@
           <a:p>
             <a:pPr lvl="0"/>
             <a:r>
-              <a:rPr lang="en-US" smtClean="0"/>
+              <a:rPr lang="en-US"/>
               <a:t>Edit Master text styles</a:t>
             </a:r>
           </a:p>
@@ -2087,7 +2098,7 @@
           <a:p>
             <a:pPr lvl="0"/>
             <a:r>
-              <a:rPr lang="en-US" smtClean="0"/>
+              <a:rPr lang="en-US"/>
               <a:t>Edit Master text styles</a:t>
             </a:r>
           </a:p>
@@ -2110,7 +2121,7 @@
           <a:p>
             <a:fld id="{5F30C13D-89CF-496E-B466-C5FA982D6985}" type="datetimeFigureOut">
               <a:rPr lang="en-US" smtClean="0"/>
-              <a:t>12/7/2017</a:t>
+              <a:t>12/10/2017</a:t>
             </a:fld>
             <a:endParaRPr lang="en-US"/>
           </a:p>
@@ -2209,7 +2220,7 @@
           <a:lstStyle/>
           <a:p>
             <a:r>
-              <a:rPr lang="en-US" smtClean="0"/>
+              <a:rPr lang="en-US"/>
               <a:t>Click to edit Master title style</a:t>
             </a:r>
             <a:endParaRPr lang="en-US" dirty="0"/>
@@ -2281,7 +2292,7 @@
           <a:p>
             <a:pPr lvl="0"/>
             <a:r>
-              <a:rPr lang="en-US" smtClean="0"/>
+              <a:rPr lang="en-US"/>
               <a:t>Edit Master text styles</a:t>
             </a:r>
           </a:p>
@@ -2359,7 +2370,7 @@
           </a:lstStyle>
           <a:p>
             <a:r>
-              <a:rPr lang="en-US" smtClean="0"/>
+              <a:rPr lang="en-US"/>
               <a:t>Click icon to add picture</a:t>
             </a:r>
             <a:endParaRPr lang="en-US" dirty="0"/>
@@ -2427,7 +2438,7 @@
           <a:p>
             <a:pPr lvl="0"/>
             <a:r>
-              <a:rPr lang="en-US" smtClean="0"/>
+              <a:rPr lang="en-US"/>
               <a:t>Edit Master text styles</a:t>
             </a:r>
           </a:p>
@@ -2498,7 +2509,7 @@
           <a:p>
             <a:pPr lvl="0"/>
             <a:r>
-              <a:rPr lang="en-US" smtClean="0"/>
+              <a:rPr lang="en-US"/>
               <a:t>Edit Master text styles</a:t>
             </a:r>
           </a:p>
@@ -2576,7 +2587,7 @@
           </a:lstStyle>
           <a:p>
             <a:r>
-              <a:rPr lang="en-US" smtClean="0"/>
+              <a:rPr lang="en-US"/>
               <a:t>Click icon to add picture</a:t>
             </a:r>
             <a:endParaRPr lang="en-US" dirty="0"/>
@@ -2644,7 +2655,7 @@
           <a:p>
             <a:pPr lvl="0"/>
             <a:r>
-              <a:rPr lang="en-US" smtClean="0"/>
+              <a:rPr lang="en-US"/>
               <a:t>Edit Master text styles</a:t>
             </a:r>
           </a:p>
@@ -2715,7 +2726,7 @@
           <a:p>
             <a:pPr lvl="0"/>
             <a:r>
-              <a:rPr lang="en-US" smtClean="0"/>
+              <a:rPr lang="en-US"/>
               <a:t>Edit Master text styles</a:t>
             </a:r>
           </a:p>
@@ -2793,7 +2804,7 @@
           </a:lstStyle>
           <a:p>
             <a:r>
-              <a:rPr lang="en-US" smtClean="0"/>
+              <a:rPr lang="en-US"/>
               <a:t>Click icon to add picture</a:t>
             </a:r>
             <a:endParaRPr lang="en-US" dirty="0"/>
@@ -2861,7 +2872,7 @@
           <a:p>
             <a:pPr lvl="0"/>
             <a:r>
-              <a:rPr lang="en-US" smtClean="0"/>
+              <a:rPr lang="en-US"/>
               <a:t>Edit Master text styles</a:t>
             </a:r>
           </a:p>
@@ -2884,7 +2895,7 @@
           <a:p>
             <a:fld id="{5F30C13D-89CF-496E-B466-C5FA982D6985}" type="datetimeFigureOut">
               <a:rPr lang="en-US" smtClean="0"/>
-              <a:t>12/7/2017</a:t>
+              <a:t>12/10/2017</a:t>
             </a:fld>
             <a:endParaRPr lang="en-US"/>
           </a:p>
@@ -2978,7 +2989,7 @@
           <a:lstStyle/>
           <a:p>
             <a:r>
-              <a:rPr lang="en-US" smtClean="0"/>
+              <a:rPr lang="en-US"/>
               <a:t>Click to edit Master title style</a:t>
             </a:r>
             <a:endParaRPr lang="en-US" dirty="0"/>
@@ -3007,35 +3018,35 @@
           <a:p>
             <a:pPr lvl="0"/>
             <a:r>
-              <a:rPr lang="en-US" smtClean="0"/>
+              <a:rPr lang="en-US"/>
               <a:t>Edit Master text styles</a:t>
             </a:r>
           </a:p>
           <a:p>
             <a:pPr lvl="1"/>
             <a:r>
-              <a:rPr lang="en-US" smtClean="0"/>
+              <a:rPr lang="en-US"/>
               <a:t>Second level</a:t>
             </a:r>
           </a:p>
           <a:p>
             <a:pPr lvl="2"/>
             <a:r>
-              <a:rPr lang="en-US" smtClean="0"/>
+              <a:rPr lang="en-US"/>
               <a:t>Third level</a:t>
             </a:r>
           </a:p>
           <a:p>
             <a:pPr lvl="3"/>
             <a:r>
-              <a:rPr lang="en-US" smtClean="0"/>
+              <a:rPr lang="en-US"/>
               <a:t>Fourth level</a:t>
             </a:r>
           </a:p>
           <a:p>
             <a:pPr lvl="4"/>
             <a:r>
-              <a:rPr lang="en-US" smtClean="0"/>
+              <a:rPr lang="en-US"/>
               <a:t>Fifth level</a:t>
             </a:r>
             <a:endParaRPr lang="en-US" dirty="0"/>
@@ -3059,7 +3070,7 @@
           <a:p>
             <a:fld id="{5F30C13D-89CF-496E-B466-C5FA982D6985}" type="datetimeFigureOut">
               <a:rPr lang="en-US" smtClean="0"/>
-              <a:t>12/7/2017</a:t>
+              <a:t>12/10/2017</a:t>
             </a:fld>
             <a:endParaRPr lang="en-US"/>
           </a:p>
@@ -3192,7 +3203,7 @@
           </a:lstStyle>
           <a:p>
             <a:r>
-              <a:rPr lang="en-US" smtClean="0"/>
+              <a:rPr lang="en-US"/>
               <a:t>Click to edit Master title style</a:t>
             </a:r>
             <a:endParaRPr lang="en-US" dirty="0"/>
@@ -3221,35 +3232,35 @@
           <a:p>
             <a:pPr lvl="0"/>
             <a:r>
-              <a:rPr lang="en-US" smtClean="0"/>
+              <a:rPr lang="en-US"/>
               <a:t>Edit Master text styles</a:t>
             </a:r>
           </a:p>
           <a:p>
             <a:pPr lvl="1"/>
             <a:r>
-              <a:rPr lang="en-US" smtClean="0"/>
+              <a:rPr lang="en-US"/>
               <a:t>Second level</a:t>
             </a:r>
           </a:p>
           <a:p>
             <a:pPr lvl="2"/>
             <a:r>
-              <a:rPr lang="en-US" smtClean="0"/>
+              <a:rPr lang="en-US"/>
               <a:t>Third level</a:t>
             </a:r>
           </a:p>
           <a:p>
             <a:pPr lvl="3"/>
             <a:r>
-              <a:rPr lang="en-US" smtClean="0"/>
+              <a:rPr lang="en-US"/>
               <a:t>Fourth level</a:t>
             </a:r>
           </a:p>
           <a:p>
             <a:pPr lvl="4"/>
             <a:r>
-              <a:rPr lang="en-US" smtClean="0"/>
+              <a:rPr lang="en-US"/>
               <a:t>Fifth level</a:t>
             </a:r>
             <a:endParaRPr lang="en-US" dirty="0"/>
@@ -3282,7 +3293,7 @@
           <a:p>
             <a:fld id="{5F30C13D-89CF-496E-B466-C5FA982D6985}" type="datetimeFigureOut">
               <a:rPr lang="en-US" smtClean="0"/>
-              <a:t>12/7/2017</a:t>
+              <a:t>12/10/2017</a:t>
             </a:fld>
             <a:endParaRPr lang="en-US"/>
           </a:p>
@@ -3386,7 +3397,7 @@
           <a:lstStyle/>
           <a:p>
             <a:r>
-              <a:rPr lang="en-US" smtClean="0"/>
+              <a:rPr lang="en-US"/>
               <a:t>Click to edit Master title style</a:t>
             </a:r>
             <a:endParaRPr lang="en-US" dirty="0"/>
@@ -3410,35 +3421,35 @@
           <a:p>
             <a:pPr lvl="0"/>
             <a:r>
-              <a:rPr lang="en-US" smtClean="0"/>
+              <a:rPr lang="en-US"/>
               <a:t>Edit Master text styles</a:t>
             </a:r>
           </a:p>
           <a:p>
             <a:pPr lvl="1"/>
             <a:r>
-              <a:rPr lang="en-US" smtClean="0"/>
+              <a:rPr lang="en-US"/>
               <a:t>Second level</a:t>
             </a:r>
           </a:p>
           <a:p>
             <a:pPr lvl="2"/>
             <a:r>
-              <a:rPr lang="en-US" smtClean="0"/>
+              <a:rPr lang="en-US"/>
               <a:t>Third level</a:t>
             </a:r>
           </a:p>
           <a:p>
             <a:pPr lvl="3"/>
             <a:r>
-              <a:rPr lang="en-US" smtClean="0"/>
+              <a:rPr lang="en-US"/>
               <a:t>Fourth level</a:t>
             </a:r>
           </a:p>
           <a:p>
             <a:pPr lvl="4"/>
             <a:r>
-              <a:rPr lang="en-US" smtClean="0"/>
+              <a:rPr lang="en-US"/>
               <a:t>Fifth level</a:t>
             </a:r>
             <a:endParaRPr lang="en-US" dirty="0"/>
@@ -3462,7 +3473,7 @@
           <a:p>
             <a:fld id="{5F30C13D-89CF-496E-B466-C5FA982D6985}" type="datetimeFigureOut">
               <a:rPr lang="en-US" smtClean="0"/>
-              <a:t>12/7/2017</a:t>
+              <a:t>12/10/2017</a:t>
             </a:fld>
             <a:endParaRPr lang="en-US"/>
           </a:p>
@@ -3597,7 +3608,7 @@
           </a:lstStyle>
           <a:p>
             <a:r>
-              <a:rPr lang="en-US" smtClean="0"/>
+              <a:rPr lang="en-US"/>
               <a:t>Click to edit Master title style</a:t>
             </a:r>
             <a:endParaRPr lang="en-US" dirty="0"/>
@@ -3719,7 +3730,7 @@
           <a:p>
             <a:pPr lvl="0"/>
             <a:r>
-              <a:rPr lang="en-US" smtClean="0"/>
+              <a:rPr lang="en-US"/>
               <a:t>Edit Master text styles</a:t>
             </a:r>
           </a:p>
@@ -3751,7 +3762,7 @@
           <a:p>
             <a:fld id="{5F30C13D-89CF-496E-B466-C5FA982D6985}" type="datetimeFigureOut">
               <a:rPr lang="en-US" smtClean="0"/>
-              <a:t>12/7/2017</a:t>
+              <a:t>12/10/2017</a:t>
             </a:fld>
             <a:endParaRPr lang="en-US"/>
           </a:p>
@@ -3855,7 +3866,7 @@
           <a:lstStyle/>
           <a:p>
             <a:r>
-              <a:rPr lang="en-US" smtClean="0"/>
+              <a:rPr lang="en-US"/>
               <a:t>Click to edit Master title style</a:t>
             </a:r>
             <a:endParaRPr lang="en-US" dirty="0"/>
@@ -3884,35 +3895,35 @@
           <a:p>
             <a:pPr lvl="0"/>
             <a:r>
-              <a:rPr lang="en-US" smtClean="0"/>
+              <a:rPr lang="en-US"/>
               <a:t>Edit Master text styles</a:t>
             </a:r>
           </a:p>
           <a:p>
             <a:pPr lvl="1"/>
             <a:r>
-              <a:rPr lang="en-US" smtClean="0"/>
+              <a:rPr lang="en-US"/>
               <a:t>Second level</a:t>
             </a:r>
           </a:p>
           <a:p>
             <a:pPr lvl="2"/>
             <a:r>
-              <a:rPr lang="en-US" smtClean="0"/>
+              <a:rPr lang="en-US"/>
               <a:t>Third level</a:t>
             </a:r>
           </a:p>
           <a:p>
             <a:pPr lvl="3"/>
             <a:r>
-              <a:rPr lang="en-US" smtClean="0"/>
+              <a:rPr lang="en-US"/>
               <a:t>Fourth level</a:t>
             </a:r>
           </a:p>
           <a:p>
             <a:pPr lvl="4"/>
             <a:r>
-              <a:rPr lang="en-US" smtClean="0"/>
+              <a:rPr lang="en-US"/>
               <a:t>Fifth level</a:t>
             </a:r>
             <a:endParaRPr lang="en-US" dirty="0"/>
@@ -3941,35 +3952,35 @@
           <a:p>
             <a:pPr lvl="0"/>
             <a:r>
-              <a:rPr lang="en-US" smtClean="0"/>
+              <a:rPr lang="en-US"/>
               <a:t>Edit Master text styles</a:t>
             </a:r>
           </a:p>
           <a:p>
             <a:pPr lvl="1"/>
             <a:r>
-              <a:rPr lang="en-US" smtClean="0"/>
+              <a:rPr lang="en-US"/>
               <a:t>Second level</a:t>
             </a:r>
           </a:p>
           <a:p>
             <a:pPr lvl="2"/>
             <a:r>
-              <a:rPr lang="en-US" smtClean="0"/>
+              <a:rPr lang="en-US"/>
               <a:t>Third level</a:t>
             </a:r>
           </a:p>
           <a:p>
             <a:pPr lvl="3"/>
             <a:r>
-              <a:rPr lang="en-US" smtClean="0"/>
+              <a:rPr lang="en-US"/>
               <a:t>Fourth level</a:t>
             </a:r>
           </a:p>
           <a:p>
             <a:pPr lvl="4"/>
             <a:r>
-              <a:rPr lang="en-US" smtClean="0"/>
+              <a:rPr lang="en-US"/>
               <a:t>Fifth level</a:t>
             </a:r>
             <a:endParaRPr lang="en-US" dirty="0"/>
@@ -3993,7 +4004,7 @@
           <a:p>
             <a:fld id="{5F30C13D-89CF-496E-B466-C5FA982D6985}" type="datetimeFigureOut">
               <a:rPr lang="en-US" smtClean="0"/>
-              <a:t>12/7/2017</a:t>
+              <a:t>12/10/2017</a:t>
             </a:fld>
             <a:endParaRPr lang="en-US"/>
           </a:p>
@@ -4092,7 +4103,7 @@
           <a:lstStyle/>
           <a:p>
             <a:r>
-              <a:rPr lang="en-US" smtClean="0"/>
+              <a:rPr lang="en-US"/>
               <a:t>Click to edit Master title style</a:t>
             </a:r>
             <a:endParaRPr lang="en-US" dirty="0"/>
@@ -4164,7 +4175,7 @@
           <a:p>
             <a:pPr lvl="0"/>
             <a:r>
-              <a:rPr lang="en-US" smtClean="0"/>
+              <a:rPr lang="en-US"/>
               <a:t>Edit Master text styles</a:t>
             </a:r>
           </a:p>
@@ -4192,35 +4203,35 @@
           <a:p>
             <a:pPr lvl="0"/>
             <a:r>
-              <a:rPr lang="en-US" smtClean="0"/>
+              <a:rPr lang="en-US"/>
               <a:t>Edit Master text styles</a:t>
             </a:r>
           </a:p>
           <a:p>
             <a:pPr lvl="1"/>
             <a:r>
-              <a:rPr lang="en-US" smtClean="0"/>
+              <a:rPr lang="en-US"/>
               <a:t>Second level</a:t>
             </a:r>
           </a:p>
           <a:p>
             <a:pPr lvl="2"/>
             <a:r>
-              <a:rPr lang="en-US" smtClean="0"/>
+              <a:rPr lang="en-US"/>
               <a:t>Third level</a:t>
             </a:r>
           </a:p>
           <a:p>
             <a:pPr lvl="3"/>
             <a:r>
-              <a:rPr lang="en-US" smtClean="0"/>
+              <a:rPr lang="en-US"/>
               <a:t>Fourth level</a:t>
             </a:r>
           </a:p>
           <a:p>
             <a:pPr lvl="4"/>
             <a:r>
-              <a:rPr lang="en-US" smtClean="0"/>
+              <a:rPr lang="en-US"/>
               <a:t>Fifth level</a:t>
             </a:r>
             <a:endParaRPr lang="en-US" dirty="0"/>
@@ -4292,7 +4303,7 @@
           <a:p>
             <a:pPr lvl="0"/>
             <a:r>
-              <a:rPr lang="en-US" smtClean="0"/>
+              <a:rPr lang="en-US"/>
               <a:t>Edit Master text styles</a:t>
             </a:r>
           </a:p>
@@ -4320,35 +4331,35 @@
           <a:p>
             <a:pPr lvl="0"/>
             <a:r>
-              <a:rPr lang="en-US" smtClean="0"/>
+              <a:rPr lang="en-US"/>
               <a:t>Edit Master text styles</a:t>
             </a:r>
           </a:p>
           <a:p>
             <a:pPr lvl="1"/>
             <a:r>
-              <a:rPr lang="en-US" smtClean="0"/>
+              <a:rPr lang="en-US"/>
               <a:t>Second level</a:t>
             </a:r>
           </a:p>
           <a:p>
             <a:pPr lvl="2"/>
             <a:r>
-              <a:rPr lang="en-US" smtClean="0"/>
+              <a:rPr lang="en-US"/>
               <a:t>Third level</a:t>
             </a:r>
           </a:p>
           <a:p>
             <a:pPr lvl="3"/>
             <a:r>
-              <a:rPr lang="en-US" smtClean="0"/>
+              <a:rPr lang="en-US"/>
               <a:t>Fourth level</a:t>
             </a:r>
           </a:p>
           <a:p>
             <a:pPr lvl="4"/>
             <a:r>
-              <a:rPr lang="en-US" smtClean="0"/>
+              <a:rPr lang="en-US"/>
               <a:t>Fifth level</a:t>
             </a:r>
             <a:endParaRPr lang="en-US" dirty="0"/>
@@ -4372,7 +4383,7 @@
           <a:p>
             <a:fld id="{5F30C13D-89CF-496E-B466-C5FA982D6985}" type="datetimeFigureOut">
               <a:rPr lang="en-US" smtClean="0"/>
-              <a:t>12/7/2017</a:t>
+              <a:t>12/10/2017</a:t>
             </a:fld>
             <a:endParaRPr lang="en-US"/>
           </a:p>
@@ -4466,7 +4477,7 @@
           <a:lstStyle/>
           <a:p>
             <a:r>
-              <a:rPr lang="en-US" smtClean="0"/>
+              <a:rPr lang="en-US"/>
               <a:t>Click to edit Master title style</a:t>
             </a:r>
             <a:endParaRPr lang="en-US" dirty="0"/>
@@ -4490,7 +4501,7 @@
           <a:p>
             <a:fld id="{5F30C13D-89CF-496E-B466-C5FA982D6985}" type="datetimeFigureOut">
               <a:rPr lang="en-US" smtClean="0"/>
-              <a:t>12/7/2017</a:t>
+              <a:t>12/10/2017</a:t>
             </a:fld>
             <a:endParaRPr lang="en-US"/>
           </a:p>
@@ -4585,7 +4596,7 @@
           <a:p>
             <a:fld id="{5F30C13D-89CF-496E-B466-C5FA982D6985}" type="datetimeFigureOut">
               <a:rPr lang="en-US" smtClean="0"/>
-              <a:t>12/7/2017</a:t>
+              <a:t>12/10/2017</a:t>
             </a:fld>
             <a:endParaRPr lang="en-US"/>
           </a:p>
@@ -4688,7 +4699,7 @@
           </a:lstStyle>
           <a:p>
             <a:r>
-              <a:rPr lang="en-US" smtClean="0"/>
+              <a:rPr lang="en-US"/>
               <a:t>Click to edit Master title style</a:t>
             </a:r>
             <a:endParaRPr lang="en-US" dirty="0"/>
@@ -4717,35 +4728,35 @@
           <a:p>
             <a:pPr lvl="0"/>
             <a:r>
-              <a:rPr lang="en-US" smtClean="0"/>
+              <a:rPr lang="en-US"/>
               <a:t>Edit Master text styles</a:t>
             </a:r>
           </a:p>
           <a:p>
             <a:pPr lvl="1"/>
             <a:r>
-              <a:rPr lang="en-US" smtClean="0"/>
+              <a:rPr lang="en-US"/>
               <a:t>Second level</a:t>
             </a:r>
           </a:p>
           <a:p>
             <a:pPr lvl="2"/>
             <a:r>
-              <a:rPr lang="en-US" smtClean="0"/>
+              <a:rPr lang="en-US"/>
               <a:t>Third level</a:t>
             </a:r>
           </a:p>
           <a:p>
             <a:pPr lvl="3"/>
             <a:r>
-              <a:rPr lang="en-US" smtClean="0"/>
+              <a:rPr lang="en-US"/>
               <a:t>Fourth level</a:t>
             </a:r>
           </a:p>
           <a:p>
             <a:pPr lvl="4"/>
             <a:r>
-              <a:rPr lang="en-US" smtClean="0"/>
+              <a:rPr lang="en-US"/>
               <a:t>Fifth level</a:t>
             </a:r>
             <a:endParaRPr lang="en-US" dirty="0"/>
@@ -4811,7 +4822,7 @@
           <a:p>
             <a:pPr lvl="0"/>
             <a:r>
-              <a:rPr lang="en-US" smtClean="0"/>
+              <a:rPr lang="en-US"/>
               <a:t>Edit Master text styles</a:t>
             </a:r>
           </a:p>
@@ -4834,7 +4845,7 @@
           <a:p>
             <a:fld id="{5F30C13D-89CF-496E-B466-C5FA982D6985}" type="datetimeFigureOut">
               <a:rPr lang="en-US" smtClean="0"/>
-              <a:t>12/7/2017</a:t>
+              <a:t>12/10/2017</a:t>
             </a:fld>
             <a:endParaRPr lang="en-US"/>
           </a:p>
@@ -4937,7 +4948,7 @@
           </a:lstStyle>
           <a:p>
             <a:r>
-              <a:rPr lang="en-US" smtClean="0"/>
+              <a:rPr lang="en-US"/>
               <a:t>Click to edit Master title style</a:t>
             </a:r>
             <a:endParaRPr lang="en-US" dirty="0"/>
@@ -5002,7 +5013,7 @@
           </a:lstStyle>
           <a:p>
             <a:r>
-              <a:rPr lang="en-US" smtClean="0"/>
+              <a:rPr lang="en-US"/>
               <a:t>Click icon to add picture</a:t>
             </a:r>
             <a:endParaRPr lang="en-US" dirty="0"/>
@@ -5068,7 +5079,7 @@
           <a:p>
             <a:pPr lvl="0"/>
             <a:r>
-              <a:rPr lang="en-US" smtClean="0"/>
+              <a:rPr lang="en-US"/>
               <a:t>Edit Master text styles</a:t>
             </a:r>
           </a:p>
@@ -5091,7 +5102,7 @@
           <a:p>
             <a:fld id="{5F30C13D-89CF-496E-B466-C5FA982D6985}" type="datetimeFigureOut">
               <a:rPr lang="en-US" smtClean="0"/>
-              <a:t>12/7/2017</a:t>
+              <a:t>12/10/2017</a:t>
             </a:fld>
             <a:endParaRPr lang="en-US"/>
           </a:p>
@@ -5230,7 +5241,7 @@
           <a:lstStyle/>
           <a:p>
             <a:r>
-              <a:rPr lang="en-US" smtClean="0"/>
+              <a:rPr lang="en-US"/>
               <a:t>Click to edit Master title style</a:t>
             </a:r>
             <a:endParaRPr lang="en-US" dirty="0"/>
@@ -5264,35 +5275,35 @@
           <a:p>
             <a:pPr lvl="0"/>
             <a:r>
-              <a:rPr lang="en-US" smtClean="0"/>
+              <a:rPr lang="en-US"/>
               <a:t>Edit Master text styles</a:t>
             </a:r>
           </a:p>
           <a:p>
             <a:pPr lvl="1"/>
             <a:r>
-              <a:rPr lang="en-US" smtClean="0"/>
+              <a:rPr lang="en-US"/>
               <a:t>Second level</a:t>
             </a:r>
           </a:p>
           <a:p>
             <a:pPr lvl="2"/>
             <a:r>
-              <a:rPr lang="en-US" smtClean="0"/>
+              <a:rPr lang="en-US"/>
               <a:t>Third level</a:t>
             </a:r>
           </a:p>
           <a:p>
             <a:pPr lvl="3"/>
             <a:r>
-              <a:rPr lang="en-US" smtClean="0"/>
+              <a:rPr lang="en-US"/>
               <a:t>Fourth level</a:t>
             </a:r>
           </a:p>
           <a:p>
             <a:pPr lvl="4"/>
             <a:r>
-              <a:rPr lang="en-US" smtClean="0"/>
+              <a:rPr lang="en-US"/>
               <a:t>Fifth level</a:t>
             </a:r>
             <a:endParaRPr lang="en-US" dirty="0"/>
@@ -5334,7 +5345,7 @@
           <a:p>
             <a:fld id="{5F30C13D-89CF-496E-B466-C5FA982D6985}" type="datetimeFigureOut">
               <a:rPr lang="en-US" smtClean="0"/>
-              <a:t>12/7/2017</a:t>
+              <a:t>12/10/2017</a:t>
             </a:fld>
             <a:endParaRPr lang="en-US"/>
           </a:p>
@@ -5761,10 +5772,9 @@
           <a:lstStyle/>
           <a:p>
             <a:r>
-              <a:rPr lang="en-US" dirty="0" smtClean="0"/>
+              <a:rPr lang="en-US" dirty="0"/>
               <a:t>Casino Management System</a:t>
             </a:r>
-            <a:endParaRPr lang="en-US" dirty="0"/>
           </a:p>
         </p:txBody>
       </p:sp>
@@ -5786,32 +5796,31 @@
           <a:lstStyle/>
           <a:p>
             <a:r>
-              <a:rPr lang="en-US" sz="1600" b="1" dirty="0" smtClean="0"/>
+              <a:rPr lang="en-US" sz="1600" b="1" dirty="0"/>
               <a:t>By: S.W.A.G. (Society of Worth Assessing Gentlemen)</a:t>
             </a:r>
           </a:p>
           <a:p>
             <a:r>
-              <a:rPr lang="en-US" sz="1600" b="1" dirty="0" smtClean="0"/>
+              <a:rPr lang="en-US" sz="1600" b="1" dirty="0"/>
               <a:t>Team Members: Henry </a:t>
             </a:r>
             <a:r>
-              <a:rPr lang="en-US" sz="1600" b="1" dirty="0" err="1" smtClean="0"/>
+              <a:rPr lang="en-US" sz="1600" b="1" dirty="0" err="1"/>
               <a:t>Felerski</a:t>
             </a:r>
             <a:r>
-              <a:rPr lang="en-US" sz="1600" b="1" dirty="0" smtClean="0"/>
+              <a:rPr lang="en-US" sz="1600" b="1" dirty="0"/>
               <a:t> (team manager), Chris Reeves, Andrew </a:t>
             </a:r>
             <a:r>
-              <a:rPr lang="en-US" sz="1600" b="1" dirty="0" err="1" smtClean="0"/>
+              <a:rPr lang="en-US" sz="1600" b="1" dirty="0" err="1"/>
               <a:t>Gantenbein</a:t>
             </a:r>
             <a:r>
-              <a:rPr lang="en-US" sz="1600" b="1" dirty="0" smtClean="0"/>
+              <a:rPr lang="en-US" sz="1600" b="1" dirty="0"/>
               <a:t>, Sullivan Cain, Tanner Hoerter </a:t>
             </a:r>
-            <a:endParaRPr lang="en-US" sz="1600" b="1" dirty="0"/>
           </a:p>
         </p:txBody>
       </p:sp>
@@ -5866,10 +5875,9 @@
           <a:lstStyle/>
           <a:p>
             <a:r>
-              <a:rPr lang="en-US" dirty="0" smtClean="0"/>
+              <a:rPr lang="en-US" dirty="0"/>
               <a:t>Use Case Diagram</a:t>
             </a:r>
-            <a:endParaRPr lang="en-US" dirty="0"/>
           </a:p>
         </p:txBody>
       </p:sp>
@@ -5953,10 +5961,9 @@
           <a:lstStyle/>
           <a:p>
             <a:r>
-              <a:rPr lang="en-US" dirty="0" smtClean="0"/>
+              <a:rPr lang="en-US" dirty="0"/>
               <a:t>Class Diagram</a:t>
             </a:r>
-            <a:endParaRPr lang="en-US" dirty="0"/>
           </a:p>
         </p:txBody>
       </p:sp>
@@ -6040,10 +6047,9 @@
           <a:lstStyle/>
           <a:p>
             <a:r>
-              <a:rPr lang="en-US" dirty="0" smtClean="0"/>
+              <a:rPr lang="en-US" dirty="0"/>
               <a:t>Robustness Diagram</a:t>
             </a:r>
-            <a:endParaRPr lang="en-US" dirty="0"/>
           </a:p>
         </p:txBody>
       </p:sp>
@@ -6127,10 +6133,9 @@
           <a:lstStyle/>
           <a:p>
             <a:r>
-              <a:rPr lang="en-US" dirty="0" smtClean="0"/>
+              <a:rPr lang="en-US" dirty="0"/>
               <a:t>Activity Diagram</a:t>
             </a:r>
-            <a:endParaRPr lang="en-US" dirty="0"/>
           </a:p>
         </p:txBody>
       </p:sp>
@@ -6214,10 +6219,9 @@
           <a:lstStyle/>
           <a:p>
             <a:r>
-              <a:rPr lang="en-US" dirty="0" smtClean="0"/>
+              <a:rPr lang="en-US" dirty="0"/>
               <a:t>Sequence and Collaboration Diagram: Message</a:t>
             </a:r>
-            <a:endParaRPr lang="en-US" dirty="0"/>
           </a:p>
         </p:txBody>
       </p:sp>
@@ -6284,6 +6288,237 @@
     <p:extLst>
       <p:ext uri="{BB962C8B-B14F-4D97-AF65-F5344CB8AC3E}">
         <p14:creationId xmlns:p14="http://schemas.microsoft.com/office/powerpoint/2010/main" val="3714461096"/>
+      </p:ext>
+    </p:extLst>
+  </p:cSld>
+  <p:clrMapOvr>
+    <a:masterClrMapping/>
+  </p:clrMapOvr>
+</p:sld>
+</file>
+
+<file path=ppt/slides/slide7.xml><?xml version="1.0" encoding="utf-8"?>
+<p:sld xmlns:a="http://schemas.openxmlformats.org/drawingml/2006/main" xmlns:r="http://schemas.openxmlformats.org/officeDocument/2006/relationships" xmlns:p="http://schemas.openxmlformats.org/presentationml/2006/main">
+  <p:cSld>
+    <p:spTree>
+      <p:nvGrpSpPr>
+        <p:cNvPr id="1" name=""/>
+        <p:cNvGrpSpPr/>
+        <p:nvPr/>
+      </p:nvGrpSpPr>
+      <p:grpSpPr>
+        <a:xfrm>
+          <a:off x="0" y="0"/>
+          <a:ext cx="0" cy="0"/>
+          <a:chOff x="0" y="0"/>
+          <a:chExt cx="0" cy="0"/>
+        </a:xfrm>
+      </p:grpSpPr>
+      <p:sp>
+        <p:nvSpPr>
+          <p:cNvPr id="2" name="Title 1">
+            <a:extLst>
+              <a:ext uri="{FF2B5EF4-FFF2-40B4-BE49-F238E27FC236}">
+                <a16:creationId xmlns:a16="http://schemas.microsoft.com/office/drawing/2014/main" id="{69B63BEB-73EA-4EE0-AC2B-0E8966063D63}"/>
+              </a:ext>
+            </a:extLst>
+          </p:cNvPr>
+          <p:cNvSpPr>
+            <a:spLocks noGrp="1"/>
+          </p:cNvSpPr>
+          <p:nvPr>
+            <p:ph type="title"/>
+          </p:nvPr>
+        </p:nvSpPr>
+        <p:spPr>
+          <a:xfrm>
+            <a:off x="1468939" y="764373"/>
+            <a:ext cx="10037261" cy="1293028"/>
+          </a:xfrm>
+        </p:spPr>
+        <p:txBody>
+          <a:bodyPr/>
+          <a:lstStyle/>
+          <a:p>
+            <a:r>
+              <a:rPr lang="en-US" dirty="0"/>
+              <a:t>Why a casino management system?</a:t>
+            </a:r>
+          </a:p>
+        </p:txBody>
+      </p:sp>
+      <p:sp>
+        <p:nvSpPr>
+          <p:cNvPr id="3" name="Content Placeholder 2">
+            <a:extLst>
+              <a:ext uri="{FF2B5EF4-FFF2-40B4-BE49-F238E27FC236}">
+                <a16:creationId xmlns:a16="http://schemas.microsoft.com/office/drawing/2014/main" id="{C9E81BAD-CA83-4606-9174-974474B56889}"/>
+              </a:ext>
+            </a:extLst>
+          </p:cNvPr>
+          <p:cNvSpPr>
+            <a:spLocks noGrp="1"/>
+          </p:cNvSpPr>
+          <p:nvPr>
+            <p:ph idx="1"/>
+          </p:nvPr>
+        </p:nvSpPr>
+        <p:spPr/>
+        <p:txBody>
+          <a:bodyPr/>
+          <a:lstStyle/>
+          <a:p>
+            <a:r>
+              <a:rPr lang="en-US" dirty="0"/>
+              <a:t>Original idea of gambling</a:t>
+            </a:r>
+          </a:p>
+          <a:p>
+            <a:r>
+              <a:rPr lang="en-US" dirty="0"/>
+              <a:t>More practical than a game</a:t>
+            </a:r>
+          </a:p>
+          <a:p>
+            <a:r>
+              <a:rPr lang="en-US" dirty="0"/>
+              <a:t>Didn’t seem outrageously difficult</a:t>
+            </a:r>
+          </a:p>
+          <a:p>
+            <a:r>
+              <a:rPr lang="en-US" dirty="0"/>
+              <a:t>Great way to focus on communication</a:t>
+            </a:r>
+          </a:p>
+          <a:p>
+            <a:pPr lvl="1"/>
+            <a:r>
+              <a:rPr lang="en-US" dirty="0"/>
+              <a:t>Between classes</a:t>
+            </a:r>
+          </a:p>
+          <a:p>
+            <a:pPr lvl="1"/>
+            <a:r>
+              <a:rPr lang="en-US" dirty="0"/>
+              <a:t>Between people</a:t>
+            </a:r>
+          </a:p>
+          <a:p>
+            <a:r>
+              <a:rPr lang="en-US" dirty="0"/>
+              <a:t>Team was in agreement</a:t>
+            </a:r>
+          </a:p>
+        </p:txBody>
+      </p:sp>
+    </p:spTree>
+    <p:extLst>
+      <p:ext uri="{BB962C8B-B14F-4D97-AF65-F5344CB8AC3E}">
+        <p14:creationId xmlns:p14="http://schemas.microsoft.com/office/powerpoint/2010/main" val="1715595490"/>
+      </p:ext>
+    </p:extLst>
+  </p:cSld>
+  <p:clrMapOvr>
+    <a:masterClrMapping/>
+  </p:clrMapOvr>
+</p:sld>
+</file>
+
+<file path=ppt/slides/slide8.xml><?xml version="1.0" encoding="utf-8"?>
+<p:sld xmlns:a="http://schemas.openxmlformats.org/drawingml/2006/main" xmlns:r="http://schemas.openxmlformats.org/officeDocument/2006/relationships" xmlns:p="http://schemas.openxmlformats.org/presentationml/2006/main">
+  <p:cSld>
+    <p:spTree>
+      <p:nvGrpSpPr>
+        <p:cNvPr id="1" name=""/>
+        <p:cNvGrpSpPr/>
+        <p:nvPr/>
+      </p:nvGrpSpPr>
+      <p:grpSpPr>
+        <a:xfrm>
+          <a:off x="0" y="0"/>
+          <a:ext cx="0" cy="0"/>
+          <a:chOff x="0" y="0"/>
+          <a:chExt cx="0" cy="0"/>
+        </a:xfrm>
+      </p:grpSpPr>
+      <p:sp>
+        <p:nvSpPr>
+          <p:cNvPr id="2" name="Title 1">
+            <a:extLst>
+              <a:ext uri="{FF2B5EF4-FFF2-40B4-BE49-F238E27FC236}">
+                <a16:creationId xmlns:a16="http://schemas.microsoft.com/office/drawing/2014/main" id="{9E42EF92-AB44-4C37-8CEA-95084305C206}"/>
+              </a:ext>
+            </a:extLst>
+          </p:cNvPr>
+          <p:cNvSpPr>
+            <a:spLocks noGrp="1"/>
+          </p:cNvSpPr>
+          <p:nvPr>
+            <p:ph type="title"/>
+          </p:nvPr>
+        </p:nvSpPr>
+        <p:spPr/>
+        <p:txBody>
+          <a:bodyPr/>
+          <a:lstStyle/>
+          <a:p>
+            <a:r>
+              <a:rPr lang="en-US" dirty="0"/>
+              <a:t>Why c#?</a:t>
+            </a:r>
+          </a:p>
+        </p:txBody>
+      </p:sp>
+      <p:sp>
+        <p:nvSpPr>
+          <p:cNvPr id="3" name="Content Placeholder 2">
+            <a:extLst>
+              <a:ext uri="{FF2B5EF4-FFF2-40B4-BE49-F238E27FC236}">
+                <a16:creationId xmlns:a16="http://schemas.microsoft.com/office/drawing/2014/main" id="{C5BC4805-BBCE-419D-AB80-91170D117B9B}"/>
+              </a:ext>
+            </a:extLst>
+          </p:cNvPr>
+          <p:cNvSpPr>
+            <a:spLocks noGrp="1"/>
+          </p:cNvSpPr>
+          <p:nvPr>
+            <p:ph idx="1"/>
+          </p:nvPr>
+        </p:nvSpPr>
+        <p:spPr/>
+        <p:txBody>
+          <a:bodyPr/>
+          <a:lstStyle/>
+          <a:p>
+            <a:r>
+              <a:rPr lang="en-US" dirty="0"/>
+              <a:t>Original plan </a:t>
+            </a:r>
+            <a:r>
+              <a:rPr lang="en-US"/>
+              <a:t>was </a:t>
+            </a:r>
+            <a:r>
+              <a:rPr lang="en-US" dirty="0"/>
+              <a:t>C</a:t>
+            </a:r>
+            <a:r>
+              <a:rPr lang="en-US"/>
+              <a:t>++</a:t>
+            </a:r>
+            <a:endParaRPr lang="en-US" dirty="0"/>
+          </a:p>
+          <a:p>
+            <a:endParaRPr lang="en-US" dirty="0"/>
+          </a:p>
+        </p:txBody>
+      </p:sp>
+    </p:spTree>
+    <p:extLst>
+      <p:ext uri="{BB962C8B-B14F-4D97-AF65-F5344CB8AC3E}">
+        <p14:creationId xmlns:p14="http://schemas.microsoft.com/office/powerpoint/2010/main" val="2079663363"/>
       </p:ext>
     </p:extLst>
   </p:cSld>

</xml_diff>

<commit_message>
Added more to "Reason for switching to C#" slide.
</commit_message>
<xml_diff>
--- a/OOAD/Casino Management System.pptx
+++ b/OOAD/Casino Management System.pptx
@@ -6466,7 +6466,7 @@
           <a:p>
             <a:r>
               <a:rPr lang="en-US" dirty="0"/>
-              <a:t>Why c#?</a:t>
+              <a:t>Why change from C++ to c#?</a:t>
             </a:r>
           </a:p>
         </p:txBody>
@@ -6494,23 +6494,38 @@
           <a:p>
             <a:r>
               <a:rPr lang="en-US" dirty="0"/>
-              <a:t>Original plan </a:t>
-            </a:r>
-            <a:r>
-              <a:rPr lang="en-US"/>
-              <a:t>was </a:t>
-            </a:r>
+              <a:t>Memory management</a:t>
+            </a:r>
+          </a:p>
+          <a:p>
+            <a:pPr lvl="1"/>
             <a:r>
               <a:rPr lang="en-US" dirty="0"/>
-              <a:t>C</a:t>
-            </a:r>
-            <a:r>
-              <a:rPr lang="en-US"/>
-              <a:t>++</a:t>
-            </a:r>
-            <a:endParaRPr lang="en-US" dirty="0"/>
-          </a:p>
-          <a:p>
+              <a:t>Delete p does not delete p</a:t>
+            </a:r>
+          </a:p>
+          <a:p>
+            <a:r>
+              <a:rPr lang="en-US" dirty="0"/>
+              <a:t>Conceptualizing during implementation</a:t>
+            </a:r>
+          </a:p>
+          <a:p>
+            <a:pPr lvl="1"/>
+            <a:r>
+              <a:rPr lang="en-US" dirty="0"/>
+              <a:t>Much easier in C#</a:t>
+            </a:r>
+          </a:p>
+          <a:p>
+            <a:r>
+              <a:rPr lang="en-US" dirty="0"/>
+              <a:t>More </a:t>
+            </a:r>
+            <a:r>
+              <a:rPr lang="en-US"/>
+              <a:t>fresh in the minds of main coders</a:t>
+            </a:r>
             <a:endParaRPr lang="en-US" dirty="0"/>
           </a:p>
         </p:txBody>

</xml_diff>